<commit_message>
updated notes in talk
</commit_message>
<xml_diff>
--- a/talks/end_of_project.pptx
+++ b/talks/end_of_project.pptx
@@ -5,7 +5,7 @@
     <p:sldMasterId id="2147483660" r:id="rId1"/>
   </p:sldMasterIdLst>
   <p:notesMasterIdLst>
-    <p:notesMasterId r:id="rId18"/>
+    <p:notesMasterId r:id="rId20"/>
   </p:notesMasterIdLst>
   <p:sldIdLst>
     <p:sldId id="256" r:id="rId2"/>
@@ -23,7 +23,9 @@
     <p:sldId id="270" r:id="rId14"/>
     <p:sldId id="266" r:id="rId15"/>
     <p:sldId id="267" r:id="rId16"/>
-    <p:sldId id="268" r:id="rId17"/>
+    <p:sldId id="272" r:id="rId17"/>
+    <p:sldId id="268" r:id="rId18"/>
+    <p:sldId id="273" r:id="rId19"/>
   </p:sldIdLst>
   <p:sldSz cx="12192000" cy="6858000"/>
   <p:notesSz cx="6858000" cy="9144000"/>
@@ -209,7 +211,7 @@
             </a:lvl1pPr>
           </a:lstStyle>
           <a:p>
-            <a:endParaRPr lang="en-US"/>
+            <a:endParaRPr lang="en-US" dirty="0"/>
           </a:p>
         </p:txBody>
       </p:sp>
@@ -244,7 +246,7 @@
               <a:rPr lang="en-US" smtClean="0"/>
               <a:t>12/6/22</a:t>
             </a:fld>
-            <a:endParaRPr lang="en-US"/>
+            <a:endParaRPr lang="en-US" dirty="0"/>
           </a:p>
         </p:txBody>
       </p:sp>
@@ -277,7 +279,7 @@
           <a:bodyPr vert="horz" lIns="91440" tIns="45720" rIns="91440" bIns="45720" rtlCol="0" anchor="ctr"/>
           <a:lstStyle/>
           <a:p>
-            <a:endParaRPr lang="en-US"/>
+            <a:endParaRPr lang="en-US" dirty="0"/>
           </a:p>
         </p:txBody>
       </p:sp>
@@ -367,7 +369,7 @@
             </a:lvl1pPr>
           </a:lstStyle>
           <a:p>
-            <a:endParaRPr lang="en-US"/>
+            <a:endParaRPr lang="en-US" dirty="0"/>
           </a:p>
         </p:txBody>
       </p:sp>
@@ -402,7 +404,7 @@
               <a:rPr lang="en-US" smtClean="0"/>
               <a:t>‹#›</a:t>
             </a:fld>
-            <a:endParaRPr lang="en-US"/>
+            <a:endParaRPr lang="en-US" dirty="0"/>
           </a:p>
         </p:txBody>
       </p:sp>
@@ -574,16 +576,187 @@
           <a:p>
             <a:fld id="{90762A6D-D4AF-F74B-8B55-693873EC09E2}" type="slidenum">
               <a:rPr lang="en-US" smtClean="0"/>
-              <a:t>2</a:t>
+              <a:t>1</a:t>
             </a:fld>
-            <a:endParaRPr lang="en-US"/>
+            <a:endParaRPr lang="en-US" dirty="0"/>
           </a:p>
         </p:txBody>
       </p:sp>
     </p:spTree>
     <p:extLst>
       <p:ext uri="{BB962C8B-B14F-4D97-AF65-F5344CB8AC3E}">
-        <p14:creationId xmlns:p14="http://schemas.microsoft.com/office/powerpoint/2010/main" val="3630761960"/>
+        <p14:creationId xmlns:p14="http://schemas.microsoft.com/office/powerpoint/2010/main" val="3572376380"/>
+      </p:ext>
+    </p:extLst>
+  </p:cSld>
+  <p:clrMapOvr>
+    <a:masterClrMapping/>
+  </p:clrMapOvr>
+</p:notes>
+</file>
+
+<file path=ppt/notesSlides/notesSlide10.xml><?xml version="1.0" encoding="utf-8"?>
+<p:notes xmlns:a="http://schemas.openxmlformats.org/drawingml/2006/main" xmlns:r="http://schemas.openxmlformats.org/officeDocument/2006/relationships" xmlns:p="http://schemas.openxmlformats.org/presentationml/2006/main">
+  <p:cSld>
+    <p:spTree>
+      <p:nvGrpSpPr>
+        <p:cNvPr id="1" name=""/>
+        <p:cNvGrpSpPr/>
+        <p:nvPr/>
+      </p:nvGrpSpPr>
+      <p:grpSpPr>
+        <a:xfrm>
+          <a:off x="0" y="0"/>
+          <a:ext cx="0" cy="0"/>
+          <a:chOff x="0" y="0"/>
+          <a:chExt cx="0" cy="0"/>
+        </a:xfrm>
+      </p:grpSpPr>
+      <p:sp>
+        <p:nvSpPr>
+          <p:cNvPr id="2" name="Slide Image Placeholder 1"/>
+          <p:cNvSpPr>
+            <a:spLocks noGrp="1" noRot="1" noChangeAspect="1"/>
+          </p:cNvSpPr>
+          <p:nvPr>
+            <p:ph type="sldImg"/>
+          </p:nvPr>
+        </p:nvSpPr>
+        <p:spPr/>
+      </p:sp>
+      <p:sp>
+        <p:nvSpPr>
+          <p:cNvPr id="3" name="Notes Placeholder 2"/>
+          <p:cNvSpPr>
+            <a:spLocks noGrp="1"/>
+          </p:cNvSpPr>
+          <p:nvPr>
+            <p:ph type="body" idx="1"/>
+          </p:nvPr>
+        </p:nvSpPr>
+        <p:spPr/>
+        <p:txBody>
+          <a:bodyPr/>
+          <a:lstStyle/>
+          <a:p>
+            <a:endParaRPr lang="en-US" dirty="0"/>
+          </a:p>
+        </p:txBody>
+      </p:sp>
+      <p:sp>
+        <p:nvSpPr>
+          <p:cNvPr id="4" name="Slide Number Placeholder 3"/>
+          <p:cNvSpPr>
+            <a:spLocks noGrp="1"/>
+          </p:cNvSpPr>
+          <p:nvPr>
+            <p:ph type="sldNum" sz="quarter" idx="5"/>
+          </p:nvPr>
+        </p:nvSpPr>
+        <p:spPr/>
+        <p:txBody>
+          <a:bodyPr/>
+          <a:lstStyle/>
+          <a:p>
+            <a:fld id="{90762A6D-D4AF-F74B-8B55-693873EC09E2}" type="slidenum">
+              <a:rPr lang="en-US" smtClean="0"/>
+              <a:t>16</a:t>
+            </a:fld>
+            <a:endParaRPr lang="en-US" dirty="0"/>
+          </a:p>
+        </p:txBody>
+      </p:sp>
+    </p:spTree>
+    <p:extLst>
+      <p:ext uri="{BB962C8B-B14F-4D97-AF65-F5344CB8AC3E}">
+        <p14:creationId xmlns:p14="http://schemas.microsoft.com/office/powerpoint/2010/main" val="236456161"/>
+      </p:ext>
+    </p:extLst>
+  </p:cSld>
+  <p:clrMapOvr>
+    <a:masterClrMapping/>
+  </p:clrMapOvr>
+</p:notes>
+</file>
+
+<file path=ppt/notesSlides/notesSlide11.xml><?xml version="1.0" encoding="utf-8"?>
+<p:notes xmlns:a="http://schemas.openxmlformats.org/drawingml/2006/main" xmlns:r="http://schemas.openxmlformats.org/officeDocument/2006/relationships" xmlns:p="http://schemas.openxmlformats.org/presentationml/2006/main">
+  <p:cSld>
+    <p:spTree>
+      <p:nvGrpSpPr>
+        <p:cNvPr id="1" name=""/>
+        <p:cNvGrpSpPr/>
+        <p:nvPr/>
+      </p:nvGrpSpPr>
+      <p:grpSpPr>
+        <a:xfrm>
+          <a:off x="0" y="0"/>
+          <a:ext cx="0" cy="0"/>
+          <a:chOff x="0" y="0"/>
+          <a:chExt cx="0" cy="0"/>
+        </a:xfrm>
+      </p:grpSpPr>
+      <p:sp>
+        <p:nvSpPr>
+          <p:cNvPr id="2" name="Slide Image Placeholder 1"/>
+          <p:cNvSpPr>
+            <a:spLocks noGrp="1" noRot="1" noChangeAspect="1"/>
+          </p:cNvSpPr>
+          <p:nvPr>
+            <p:ph type="sldImg"/>
+          </p:nvPr>
+        </p:nvSpPr>
+        <p:spPr/>
+      </p:sp>
+      <p:sp>
+        <p:nvSpPr>
+          <p:cNvPr id="3" name="Notes Placeholder 2"/>
+          <p:cNvSpPr>
+            <a:spLocks noGrp="1"/>
+          </p:cNvSpPr>
+          <p:nvPr>
+            <p:ph type="body" idx="1"/>
+          </p:nvPr>
+        </p:nvSpPr>
+        <p:spPr/>
+        <p:txBody>
+          <a:bodyPr/>
+          <a:lstStyle/>
+          <a:p>
+            <a:r>
+              <a:rPr lang="en-US" dirty="0"/>
+              <a:t>Making your data FAIR means that its discoverable by other people and ideally computers, they can acquire the materials they found, they can open the materials, and the materials have enough context that they can be included in other analyses. </a:t>
+            </a:r>
+          </a:p>
+        </p:txBody>
+      </p:sp>
+      <p:sp>
+        <p:nvSpPr>
+          <p:cNvPr id="4" name="Slide Number Placeholder 3"/>
+          <p:cNvSpPr>
+            <a:spLocks noGrp="1"/>
+          </p:cNvSpPr>
+          <p:nvPr>
+            <p:ph type="sldNum" sz="quarter" idx="5"/>
+          </p:nvPr>
+        </p:nvSpPr>
+        <p:spPr/>
+        <p:txBody>
+          <a:bodyPr/>
+          <a:lstStyle/>
+          <a:p>
+            <a:fld id="{90762A6D-D4AF-F74B-8B55-693873EC09E2}" type="slidenum">
+              <a:rPr lang="en-US" smtClean="0"/>
+              <a:t>17</a:t>
+            </a:fld>
+            <a:endParaRPr lang="en-US" dirty="0"/>
+          </a:p>
+        </p:txBody>
+      </p:sp>
+    </p:spTree>
+    <p:extLst>
+      <p:ext uri="{BB962C8B-B14F-4D97-AF65-F5344CB8AC3E}">
+        <p14:creationId xmlns:p14="http://schemas.microsoft.com/office/powerpoint/2010/main" val="2218590207"/>
       </p:ext>
     </p:extLst>
   </p:cSld>
@@ -637,53 +810,6 @@
           <a:bodyPr/>
           <a:lstStyle/>
           <a:p>
-            <a:pPr lvl="0"/>
-            <a:r>
-              <a:rPr lang="en-US" dirty="0"/>
-              <a:t>- This strategy was developed off the archetypal EHA project that creates animal sampling (in Airtable) and human survey data (in ODK), and uses other data sets to inform statistical modeling done in R.</a:t>
-            </a:r>
-          </a:p>
-          <a:p>
-            <a:pPr lvl="0"/>
-            <a:r>
-              <a:rPr lang="en-US" dirty="0"/>
-              <a:t>Decouple publication of results from release of data and code</a:t>
-            </a:r>
-          </a:p>
-          <a:p>
-            <a:pPr lvl="0"/>
-            <a:r>
-              <a:rPr lang="en-US" dirty="0"/>
-              <a:t>Over arching goal is to end projects with FAIR research outputs</a:t>
-            </a:r>
-          </a:p>
-          <a:p>
-            <a:endParaRPr lang="en-US" dirty="0"/>
-          </a:p>
-          <a:p>
-            <a:pPr marL="0" marR="0" lvl="0" indent="0" algn="l" defTabSz="914400" rtl="0" eaLnBrk="1" fontAlgn="auto" latinLnBrk="0" hangingPunct="1">
-              <a:lnSpc>
-                <a:spcPct val="100000"/>
-              </a:lnSpc>
-              <a:spcBef>
-                <a:spcPts val="0"/>
-              </a:spcBef>
-              <a:spcAft>
-                <a:spcPts val="0"/>
-              </a:spcAft>
-              <a:buClrTx/>
-              <a:buSzTx/>
-              <a:buFontTx/>
-              <a:buNone/>
-              <a:tabLst/>
-              <a:defRPr/>
-            </a:pPr>
-            <a:r>
-              <a:rPr lang="en-US" dirty="0"/>
-              <a:t>FAIR – findable accessible Interoperable and reproducible- meaning that your data is   discoverable by other people and ideally computers, they can acquire the materials they found, they can open the materials, and the materials have enough context that they can be included in other analyses. </a:t>
-            </a:r>
-          </a:p>
-          <a:p>
             <a:endParaRPr lang="en-US" dirty="0"/>
           </a:p>
         </p:txBody>
@@ -705,16 +831,16 @@
           <a:p>
             <a:fld id="{90762A6D-D4AF-F74B-8B55-693873EC09E2}" type="slidenum">
               <a:rPr lang="en-US" smtClean="0"/>
-              <a:t>4</a:t>
+              <a:t>2</a:t>
             </a:fld>
-            <a:endParaRPr lang="en-US"/>
+            <a:endParaRPr lang="en-US" dirty="0"/>
           </a:p>
         </p:txBody>
       </p:sp>
     </p:spTree>
     <p:extLst>
       <p:ext uri="{BB962C8B-B14F-4D97-AF65-F5344CB8AC3E}">
-        <p14:creationId xmlns:p14="http://schemas.microsoft.com/office/powerpoint/2010/main" val="2921595536"/>
+        <p14:creationId xmlns:p14="http://schemas.microsoft.com/office/powerpoint/2010/main" val="3630761960"/>
       </p:ext>
     </p:extLst>
   </p:cSld>
@@ -768,6 +894,53 @@
           <a:bodyPr/>
           <a:lstStyle/>
           <a:p>
+            <a:pPr lvl="0"/>
+            <a:r>
+              <a:rPr lang="en-US" dirty="0"/>
+              <a:t>- This strategy was developed off the archetypal EHA project that creates animal sampling (in Airtable) and human survey data (in ODK), and uses other data sets to inform statistical modeling done in R.</a:t>
+            </a:r>
+          </a:p>
+          <a:p>
+            <a:pPr lvl="0"/>
+            <a:r>
+              <a:rPr lang="en-US" dirty="0"/>
+              <a:t>Decouple publication of results from release of data and code</a:t>
+            </a:r>
+          </a:p>
+          <a:p>
+            <a:pPr lvl="0"/>
+            <a:r>
+              <a:rPr lang="en-US" dirty="0"/>
+              <a:t>Over arching goal is to end projects with FAIR research outputs</a:t>
+            </a:r>
+          </a:p>
+          <a:p>
+            <a:endParaRPr lang="en-US" dirty="0"/>
+          </a:p>
+          <a:p>
+            <a:pPr marL="0" marR="0" lvl="0" indent="0" algn="l" defTabSz="914400" rtl="0" eaLnBrk="1" fontAlgn="auto" latinLnBrk="0" hangingPunct="1">
+              <a:lnSpc>
+                <a:spcPct val="100000"/>
+              </a:lnSpc>
+              <a:spcBef>
+                <a:spcPts val="0"/>
+              </a:spcBef>
+              <a:spcAft>
+                <a:spcPts val="0"/>
+              </a:spcAft>
+              <a:buClrTx/>
+              <a:buSzTx/>
+              <a:buFontTx/>
+              <a:buNone/>
+              <a:tabLst/>
+              <a:defRPr/>
+            </a:pPr>
+            <a:r>
+              <a:rPr lang="en-US" dirty="0"/>
+              <a:t>FAIR – findable accessible Interoperable and reproducible- meaning that your data is   discoverable by other people and ideally computers, they can acquire the materials they found, they can open the materials, and the materials have enough context that they can be included in other analyses. </a:t>
+            </a:r>
+          </a:p>
+          <a:p>
             <a:endParaRPr lang="en-US" dirty="0"/>
           </a:p>
         </p:txBody>
@@ -789,16 +962,16 @@
           <a:p>
             <a:fld id="{90762A6D-D4AF-F74B-8B55-693873EC09E2}" type="slidenum">
               <a:rPr lang="en-US" smtClean="0"/>
-              <a:t>9</a:t>
+              <a:t>4</a:t>
             </a:fld>
-            <a:endParaRPr lang="en-US"/>
+            <a:endParaRPr lang="en-US" dirty="0"/>
           </a:p>
         </p:txBody>
       </p:sp>
     </p:spTree>
     <p:extLst>
       <p:ext uri="{BB962C8B-B14F-4D97-AF65-F5344CB8AC3E}">
-        <p14:creationId xmlns:p14="http://schemas.microsoft.com/office/powerpoint/2010/main" val="3171612308"/>
+        <p14:creationId xmlns:p14="http://schemas.microsoft.com/office/powerpoint/2010/main" val="2921595536"/>
       </p:ext>
     </p:extLst>
   </p:cSld>
@@ -852,29 +1025,6 @@
           <a:bodyPr/>
           <a:lstStyle/>
           <a:p>
-            <a:pPr marL="0" marR="0" lvl="0" indent="0" algn="l" defTabSz="914400" rtl="0" eaLnBrk="1" fontAlgn="auto" latinLnBrk="0" hangingPunct="1">
-              <a:lnSpc>
-                <a:spcPct val="100000"/>
-              </a:lnSpc>
-              <a:spcBef>
-                <a:spcPts val="0"/>
-              </a:spcBef>
-              <a:spcAft>
-                <a:spcPts val="0"/>
-              </a:spcAft>
-              <a:buClrTx/>
-              <a:buSzTx/>
-              <a:buFontTx/>
-              <a:buNone/>
-              <a:tabLst/>
-              <a:defRPr/>
-            </a:pPr>
-            <a:r>
-              <a:rPr lang="en-US" dirty="0"/>
-              <a:t>Do all projects need to go through this process – no</a:t>
-            </a:r>
-          </a:p>
-          <a:p>
             <a:endParaRPr lang="en-US" dirty="0"/>
           </a:p>
         </p:txBody>
@@ -896,16 +1046,16 @@
           <a:p>
             <a:fld id="{90762A6D-D4AF-F74B-8B55-693873EC09E2}" type="slidenum">
               <a:rPr lang="en-US" smtClean="0"/>
-              <a:t>11</a:t>
+              <a:t>9</a:t>
             </a:fld>
-            <a:endParaRPr lang="en-US"/>
+            <a:endParaRPr lang="en-US" dirty="0"/>
           </a:p>
         </p:txBody>
       </p:sp>
     </p:spTree>
     <p:extLst>
       <p:ext uri="{BB962C8B-B14F-4D97-AF65-F5344CB8AC3E}">
-        <p14:creationId xmlns:p14="http://schemas.microsoft.com/office/powerpoint/2010/main" val="187937797"/>
+        <p14:creationId xmlns:p14="http://schemas.microsoft.com/office/powerpoint/2010/main" val="3171612308"/>
       </p:ext>
     </p:extLst>
   </p:cSld>
@@ -980,16 +1130,16 @@
           <a:p>
             <a:fld id="{90762A6D-D4AF-F74B-8B55-693873EC09E2}" type="slidenum">
               <a:rPr lang="en-US" smtClean="0"/>
-              <a:t>12</a:t>
+              <a:t>10</a:t>
             </a:fld>
-            <a:endParaRPr lang="en-US"/>
+            <a:endParaRPr lang="en-US" dirty="0"/>
           </a:p>
         </p:txBody>
       </p:sp>
     </p:spTree>
     <p:extLst>
       <p:ext uri="{BB962C8B-B14F-4D97-AF65-F5344CB8AC3E}">
-        <p14:creationId xmlns:p14="http://schemas.microsoft.com/office/powerpoint/2010/main" val="1624982419"/>
+        <p14:creationId xmlns:p14="http://schemas.microsoft.com/office/powerpoint/2010/main" val="3374190162"/>
       </p:ext>
     </p:extLst>
   </p:cSld>
@@ -1043,6 +1193,29 @@
           <a:bodyPr/>
           <a:lstStyle/>
           <a:p>
+            <a:pPr marL="0" marR="0" lvl="0" indent="0" algn="l" defTabSz="914400" rtl="0" eaLnBrk="1" fontAlgn="auto" latinLnBrk="0" hangingPunct="1">
+              <a:lnSpc>
+                <a:spcPct val="100000"/>
+              </a:lnSpc>
+              <a:spcBef>
+                <a:spcPts val="0"/>
+              </a:spcBef>
+              <a:spcAft>
+                <a:spcPts val="0"/>
+              </a:spcAft>
+              <a:buClrTx/>
+              <a:buSzTx/>
+              <a:buFontTx/>
+              <a:buNone/>
+              <a:tabLst/>
+              <a:defRPr/>
+            </a:pPr>
+            <a:r>
+              <a:rPr lang="en-US" dirty="0"/>
+              <a:t>Do all projects need to go through this process – no</a:t>
+            </a:r>
+          </a:p>
+          <a:p>
             <a:endParaRPr lang="en-US" dirty="0"/>
           </a:p>
         </p:txBody>
@@ -1064,16 +1237,16 @@
           <a:p>
             <a:fld id="{90762A6D-D4AF-F74B-8B55-693873EC09E2}" type="slidenum">
               <a:rPr lang="en-US" smtClean="0"/>
-              <a:t>14</a:t>
+              <a:t>11</a:t>
             </a:fld>
-            <a:endParaRPr lang="en-US"/>
+            <a:endParaRPr lang="en-US" dirty="0"/>
           </a:p>
         </p:txBody>
       </p:sp>
     </p:spTree>
     <p:extLst>
       <p:ext uri="{BB962C8B-B14F-4D97-AF65-F5344CB8AC3E}">
-        <p14:creationId xmlns:p14="http://schemas.microsoft.com/office/powerpoint/2010/main" val="23650197"/>
+        <p14:creationId xmlns:p14="http://schemas.microsoft.com/office/powerpoint/2010/main" val="187937797"/>
       </p:ext>
     </p:extLst>
   </p:cSld>
@@ -1127,10 +1300,7 @@
           <a:bodyPr/>
           <a:lstStyle/>
           <a:p>
-            <a:r>
-              <a:rPr lang="en-US" dirty="0"/>
-              <a:t>Making your data FAIR means that its discoverable by other people and ideally computers, they can acquire the materials they found, they can open the materials, and the materials have enough context that they can be included in other analyses. </a:t>
-            </a:r>
+            <a:endParaRPr lang="en-US" dirty="0"/>
           </a:p>
         </p:txBody>
       </p:sp>
@@ -1151,16 +1321,366 @@
           <a:p>
             <a:fld id="{90762A6D-D4AF-F74B-8B55-693873EC09E2}" type="slidenum">
               <a:rPr lang="en-US" smtClean="0"/>
-              <a:t>16</a:t>
+              <a:t>12</a:t>
             </a:fld>
-            <a:endParaRPr lang="en-US"/>
+            <a:endParaRPr lang="en-US" dirty="0"/>
           </a:p>
         </p:txBody>
       </p:sp>
     </p:spTree>
     <p:extLst>
       <p:ext uri="{BB962C8B-B14F-4D97-AF65-F5344CB8AC3E}">
-        <p14:creationId xmlns:p14="http://schemas.microsoft.com/office/powerpoint/2010/main" val="2218590207"/>
+        <p14:creationId xmlns:p14="http://schemas.microsoft.com/office/powerpoint/2010/main" val="1624982419"/>
+      </p:ext>
+    </p:extLst>
+  </p:cSld>
+  <p:clrMapOvr>
+    <a:masterClrMapping/>
+  </p:clrMapOvr>
+</p:notes>
+</file>
+
+<file path=ppt/notesSlides/notesSlide8.xml><?xml version="1.0" encoding="utf-8"?>
+<p:notes xmlns:a="http://schemas.openxmlformats.org/drawingml/2006/main" xmlns:r="http://schemas.openxmlformats.org/officeDocument/2006/relationships" xmlns:p="http://schemas.openxmlformats.org/presentationml/2006/main">
+  <p:cSld>
+    <p:spTree>
+      <p:nvGrpSpPr>
+        <p:cNvPr id="1" name=""/>
+        <p:cNvGrpSpPr/>
+        <p:nvPr/>
+      </p:nvGrpSpPr>
+      <p:grpSpPr>
+        <a:xfrm>
+          <a:off x="0" y="0"/>
+          <a:ext cx="0" cy="0"/>
+          <a:chOff x="0" y="0"/>
+          <a:chExt cx="0" cy="0"/>
+        </a:xfrm>
+      </p:grpSpPr>
+      <p:sp>
+        <p:nvSpPr>
+          <p:cNvPr id="2" name="Slide Image Placeholder 1"/>
+          <p:cNvSpPr>
+            <a:spLocks noGrp="1" noRot="1" noChangeAspect="1"/>
+          </p:cNvSpPr>
+          <p:nvPr>
+            <p:ph type="sldImg"/>
+          </p:nvPr>
+        </p:nvSpPr>
+        <p:spPr/>
+      </p:sp>
+      <p:sp>
+        <p:nvSpPr>
+          <p:cNvPr id="3" name="Notes Placeholder 2"/>
+          <p:cNvSpPr>
+            <a:spLocks noGrp="1"/>
+          </p:cNvSpPr>
+          <p:nvPr>
+            <p:ph type="body" idx="1"/>
+          </p:nvPr>
+        </p:nvSpPr>
+        <p:spPr/>
+        <p:txBody>
+          <a:bodyPr/>
+          <a:lstStyle/>
+          <a:p>
+            <a:r>
+              <a:rPr lang="en-US" dirty="0"/>
+              <a:t>I want everyone to think about a project they are currently working on. Lets say that you’ve included the following in your DMP. </a:t>
+            </a:r>
+          </a:p>
+          <a:p>
+            <a:endParaRPr lang="en-US" dirty="0"/>
+          </a:p>
+          <a:p>
+            <a:r>
+              <a:rPr lang="en-US" dirty="0"/>
+              <a:t>What does NIH policy mean?</a:t>
+            </a:r>
+          </a:p>
+          <a:p>
+            <a:r>
+              <a:rPr lang="en-US" dirty="0"/>
+              <a:t>Type of data sharing with NIH ---</a:t>
+            </a:r>
+          </a:p>
+          <a:p>
+            <a:r>
+              <a:rPr lang="en-US" dirty="0"/>
+              <a:t>With partners in non-us countries - we spend a lot of time setting up data sharing agreements. Even materials transfer it depends on types of data and significance of findings. Best we can do is working </a:t>
+            </a:r>
+          </a:p>
+          <a:p>
+            <a:endParaRPr lang="en-US" dirty="0"/>
+          </a:p>
+          <a:p>
+            <a:r>
+              <a:rPr lang="en-US" dirty="0"/>
+              <a:t>Each project with 5-6 institutions - starting this conversation is very helpful. </a:t>
+            </a:r>
+          </a:p>
+          <a:p>
+            <a:endParaRPr lang="en-US" dirty="0"/>
+          </a:p>
+          <a:p>
+            <a:r>
+              <a:rPr lang="en-US" dirty="0"/>
+              <a:t>1) Most important client is yourself - even we </a:t>
+            </a:r>
+          </a:p>
+          <a:p>
+            <a:r>
+              <a:rPr lang="en-US" dirty="0"/>
+              <a:t>2) there is a time where you have no more funding where going back to the data and documenting it becomes extremely difficult. </a:t>
+            </a:r>
+          </a:p>
+          <a:p>
+            <a:r>
+              <a:rPr lang="en-US" dirty="0"/>
+              <a:t>3) Important this </a:t>
+            </a:r>
+            <a:r>
+              <a:rPr lang="en-US" dirty="0" err="1"/>
+              <a:t>doesnt</a:t>
+            </a:r>
+            <a:r>
+              <a:rPr lang="en-US" dirty="0"/>
+              <a:t> come last minute scramble </a:t>
+            </a:r>
+          </a:p>
+          <a:p>
+            <a:endParaRPr lang="en-US" dirty="0"/>
+          </a:p>
+          <a:p>
+            <a:r>
+              <a:rPr lang="en-US" dirty="0"/>
+              <a:t>What </a:t>
+            </a:r>
+            <a:r>
+              <a:rPr lang="en-US" dirty="0" err="1"/>
+              <a:t>didnt</a:t>
+            </a:r>
+            <a:r>
+              <a:rPr lang="en-US" dirty="0"/>
+              <a:t> we do well on predict - end of predict -- where are the samples, what are the </a:t>
+            </a:r>
+            <a:r>
+              <a:rPr lang="en-US" dirty="0" err="1"/>
+              <a:t>codiitions</a:t>
+            </a:r>
+            <a:r>
+              <a:rPr lang="en-US" dirty="0"/>
+              <a:t> for that, physical, EDITH - now with USAID is hard to access and many data are not published. </a:t>
+            </a:r>
+          </a:p>
+          <a:p>
+            <a:r>
+              <a:rPr lang="en-US" dirty="0"/>
+              <a:t>- when we </a:t>
+            </a:r>
+          </a:p>
+          <a:p>
+            <a:endParaRPr lang="en-US" dirty="0"/>
+          </a:p>
+          <a:p>
+            <a:r>
+              <a:rPr lang="en-US" dirty="0"/>
+              <a:t>We did a good job in the beginning honoring partner relationships - went too close to the end on wrap up. Need to build in more time when we are funded and bring partners along. well before the end -- no surprises for partners. </a:t>
+            </a:r>
+            <a:br>
+              <a:rPr lang="en-US" dirty="0"/>
+            </a:br>
+            <a:br>
+              <a:rPr lang="en-US" dirty="0"/>
+            </a:br>
+            <a:r>
+              <a:rPr lang="en-US" dirty="0"/>
+              <a:t>Trigger conversation and process early - it </a:t>
+            </a:r>
+            <a:r>
+              <a:rPr lang="en-US" dirty="0" err="1"/>
+              <a:t>didnt</a:t>
+            </a:r>
+            <a:r>
+              <a:rPr lang="en-US" dirty="0"/>
+              <a:t> have an end state in mind. All cleaning </a:t>
+            </a:r>
+            <a:r>
+              <a:rPr lang="en-US" dirty="0" err="1"/>
+              <a:t>happned</a:t>
+            </a:r>
+            <a:r>
+              <a:rPr lang="en-US" dirty="0"/>
+              <a:t> at the end. Currently happening on an on </a:t>
+            </a:r>
+            <a:r>
+              <a:rPr lang="en-US" dirty="0" err="1"/>
+              <a:t>goingn</a:t>
+            </a:r>
+            <a:r>
+              <a:rPr lang="en-US" dirty="0"/>
+              <a:t> basis. </a:t>
+            </a:r>
+          </a:p>
+        </p:txBody>
+      </p:sp>
+      <p:sp>
+        <p:nvSpPr>
+          <p:cNvPr id="4" name="Slide Number Placeholder 3"/>
+          <p:cNvSpPr>
+            <a:spLocks noGrp="1"/>
+          </p:cNvSpPr>
+          <p:nvPr>
+            <p:ph type="sldNum" sz="quarter" idx="5"/>
+          </p:nvPr>
+        </p:nvSpPr>
+        <p:spPr/>
+        <p:txBody>
+          <a:bodyPr/>
+          <a:lstStyle/>
+          <a:p>
+            <a:fld id="{90762A6D-D4AF-F74B-8B55-693873EC09E2}" type="slidenum">
+              <a:rPr lang="en-US" smtClean="0"/>
+              <a:t>14</a:t>
+            </a:fld>
+            <a:endParaRPr lang="en-US" dirty="0"/>
+          </a:p>
+        </p:txBody>
+      </p:sp>
+    </p:spTree>
+    <p:extLst>
+      <p:ext uri="{BB962C8B-B14F-4D97-AF65-F5344CB8AC3E}">
+        <p14:creationId xmlns:p14="http://schemas.microsoft.com/office/powerpoint/2010/main" val="23650197"/>
+      </p:ext>
+    </p:extLst>
+  </p:cSld>
+  <p:clrMapOvr>
+    <a:masterClrMapping/>
+  </p:clrMapOvr>
+</p:notes>
+</file>
+
+<file path=ppt/notesSlides/notesSlide9.xml><?xml version="1.0" encoding="utf-8"?>
+<p:notes xmlns:a="http://schemas.openxmlformats.org/drawingml/2006/main" xmlns:r="http://schemas.openxmlformats.org/officeDocument/2006/relationships" xmlns:p="http://schemas.openxmlformats.org/presentationml/2006/main">
+  <p:cSld>
+    <p:spTree>
+      <p:nvGrpSpPr>
+        <p:cNvPr id="1" name=""/>
+        <p:cNvGrpSpPr/>
+        <p:nvPr/>
+      </p:nvGrpSpPr>
+      <p:grpSpPr>
+        <a:xfrm>
+          <a:off x="0" y="0"/>
+          <a:ext cx="0" cy="0"/>
+          <a:chOff x="0" y="0"/>
+          <a:chExt cx="0" cy="0"/>
+        </a:xfrm>
+      </p:grpSpPr>
+      <p:sp>
+        <p:nvSpPr>
+          <p:cNvPr id="2" name="Slide Image Placeholder 1"/>
+          <p:cNvSpPr>
+            <a:spLocks noGrp="1" noRot="1" noChangeAspect="1"/>
+          </p:cNvSpPr>
+          <p:nvPr>
+            <p:ph type="sldImg"/>
+          </p:nvPr>
+        </p:nvSpPr>
+        <p:spPr/>
+      </p:sp>
+      <p:sp>
+        <p:nvSpPr>
+          <p:cNvPr id="3" name="Notes Placeholder 2"/>
+          <p:cNvSpPr>
+            <a:spLocks noGrp="1"/>
+          </p:cNvSpPr>
+          <p:nvPr>
+            <p:ph type="body" idx="1"/>
+          </p:nvPr>
+        </p:nvSpPr>
+        <p:spPr/>
+        <p:txBody>
+          <a:bodyPr/>
+          <a:lstStyle/>
+          <a:p>
+            <a:r>
+              <a:rPr lang="en-US" dirty="0" err="1"/>
+              <a:t>Whats</a:t>
+            </a:r>
+            <a:r>
+              <a:rPr lang="en-US" dirty="0"/>
+              <a:t> the scope of the data in the project - this is the whole project dataset from this is the publication. </a:t>
+            </a:r>
+          </a:p>
+          <a:p>
+            <a:endParaRPr lang="en-US" dirty="0"/>
+          </a:p>
+          <a:p>
+            <a:r>
+              <a:rPr lang="en-US" dirty="0"/>
+              <a:t>Tensions with care principle - </a:t>
+            </a:r>
+          </a:p>
+          <a:p>
+            <a:endParaRPr lang="en-US" dirty="0"/>
+          </a:p>
+          <a:p>
+            <a:r>
+              <a:rPr lang="en-US" dirty="0" err="1"/>
+              <a:t>Whats</a:t>
+            </a:r>
+            <a:r>
+              <a:rPr lang="en-US" dirty="0"/>
+              <a:t> our expectation given timeline --- </a:t>
+            </a:r>
+          </a:p>
+          <a:p>
+            <a:endParaRPr lang="en-US" dirty="0"/>
+          </a:p>
+          <a:p>
+            <a:r>
+              <a:rPr lang="en-US" dirty="0"/>
+              <a:t>6 m </a:t>
+            </a:r>
+            <a:r>
+              <a:rPr lang="en-US" dirty="0" err="1"/>
+              <a:t>onths</a:t>
+            </a:r>
+            <a:r>
+              <a:rPr lang="en-US" dirty="0"/>
+              <a:t> to </a:t>
+            </a:r>
+          </a:p>
+        </p:txBody>
+      </p:sp>
+      <p:sp>
+        <p:nvSpPr>
+          <p:cNvPr id="4" name="Slide Number Placeholder 3"/>
+          <p:cNvSpPr>
+            <a:spLocks noGrp="1"/>
+          </p:cNvSpPr>
+          <p:nvPr>
+            <p:ph type="sldNum" sz="quarter" idx="5"/>
+          </p:nvPr>
+        </p:nvSpPr>
+        <p:spPr/>
+        <p:txBody>
+          <a:bodyPr/>
+          <a:lstStyle/>
+          <a:p>
+            <a:fld id="{90762A6D-D4AF-F74B-8B55-693873EC09E2}" type="slidenum">
+              <a:rPr lang="en-US" smtClean="0"/>
+              <a:t>15</a:t>
+            </a:fld>
+            <a:endParaRPr lang="en-US" dirty="0"/>
+          </a:p>
+        </p:txBody>
+      </p:sp>
+    </p:spTree>
+    <p:extLst>
+      <p:ext uri="{BB962C8B-B14F-4D97-AF65-F5344CB8AC3E}">
+        <p14:creationId xmlns:p14="http://schemas.microsoft.com/office/powerpoint/2010/main" val="538770088"/>
       </p:ext>
     </p:extLst>
   </p:cSld>
@@ -1351,7 +1871,7 @@
               </a:pPr>
               <a:t>12/6/22</a:t>
             </a:fld>
-            <a:endParaRPr lang="en-US"/>
+            <a:endParaRPr lang="en-US" dirty="0"/>
           </a:p>
         </p:txBody>
       </p:sp>
@@ -1382,7 +1902,7 @@
             <a:pPr>
               <a:defRPr/>
             </a:pPr>
-            <a:endParaRPr lang="en-US"/>
+            <a:endParaRPr lang="en-US" dirty="0"/>
           </a:p>
         </p:txBody>
       </p:sp>
@@ -1420,7 +1940,7 @@
               </a:pPr>
               <a:t>‹#›</a:t>
             </a:fld>
-            <a:endParaRPr lang="en-US"/>
+            <a:endParaRPr lang="en-US" dirty="0"/>
           </a:p>
         </p:txBody>
       </p:sp>
@@ -1592,7 +2112,7 @@
               </a:pPr>
               <a:t>12/6/22</a:t>
             </a:fld>
-            <a:endParaRPr lang="en-US"/>
+            <a:endParaRPr lang="en-US" dirty="0"/>
           </a:p>
         </p:txBody>
       </p:sp>
@@ -1618,7 +2138,7 @@
             <a:pPr>
               <a:defRPr/>
             </a:pPr>
-            <a:endParaRPr lang="en-US"/>
+            <a:endParaRPr lang="en-US" dirty="0"/>
           </a:p>
         </p:txBody>
       </p:sp>
@@ -1651,7 +2171,7 @@
               </a:pPr>
               <a:t>‹#›</a:t>
             </a:fld>
-            <a:endParaRPr lang="en-US"/>
+            <a:endParaRPr lang="en-US" dirty="0"/>
           </a:p>
         </p:txBody>
       </p:sp>
@@ -1802,7 +2322,7 @@
               </a:pPr>
               <a:t>12/6/22</a:t>
             </a:fld>
-            <a:endParaRPr lang="en-US"/>
+            <a:endParaRPr lang="en-US" dirty="0"/>
           </a:p>
         </p:txBody>
       </p:sp>
@@ -1828,7 +2348,7 @@
             <a:pPr>
               <a:defRPr/>
             </a:pPr>
-            <a:endParaRPr lang="en-US"/>
+            <a:endParaRPr lang="en-US" dirty="0"/>
           </a:p>
         </p:txBody>
       </p:sp>
@@ -1861,7 +2381,7 @@
               </a:pPr>
               <a:t>‹#›</a:t>
             </a:fld>
-            <a:endParaRPr lang="en-US"/>
+            <a:endParaRPr lang="en-US" dirty="0"/>
           </a:p>
         </p:txBody>
       </p:sp>
@@ -2007,7 +2527,7 @@
               </a:pPr>
               <a:t>12/6/22</a:t>
             </a:fld>
-            <a:endParaRPr lang="en-US"/>
+            <a:endParaRPr lang="en-US" dirty="0"/>
           </a:p>
         </p:txBody>
       </p:sp>
@@ -2033,7 +2553,7 @@
             <a:pPr>
               <a:defRPr/>
             </a:pPr>
-            <a:endParaRPr lang="en-US"/>
+            <a:endParaRPr lang="en-US" dirty="0"/>
           </a:p>
         </p:txBody>
       </p:sp>
@@ -2066,7 +2586,7 @@
               </a:pPr>
               <a:t>‹#›</a:t>
             </a:fld>
-            <a:endParaRPr lang="en-US"/>
+            <a:endParaRPr lang="en-US" dirty="0"/>
           </a:p>
         </p:txBody>
       </p:sp>
@@ -2281,7 +2801,7 @@
               </a:pPr>
               <a:t>12/6/22</a:t>
             </a:fld>
-            <a:endParaRPr lang="en-US"/>
+            <a:endParaRPr lang="en-US" dirty="0"/>
           </a:p>
         </p:txBody>
       </p:sp>
@@ -2307,7 +2827,7 @@
             <a:pPr>
               <a:defRPr/>
             </a:pPr>
-            <a:endParaRPr lang="en-US"/>
+            <a:endParaRPr lang="en-US" dirty="0"/>
           </a:p>
         </p:txBody>
       </p:sp>
@@ -2340,7 +2860,7 @@
               </a:pPr>
               <a:t>‹#›</a:t>
             </a:fld>
-            <a:endParaRPr lang="en-US"/>
+            <a:endParaRPr lang="en-US" dirty="0"/>
           </a:p>
         </p:txBody>
       </p:sp>
@@ -2548,7 +3068,7 @@
               </a:pPr>
               <a:t>12/6/22</a:t>
             </a:fld>
-            <a:endParaRPr lang="en-US"/>
+            <a:endParaRPr lang="en-US" dirty="0"/>
           </a:p>
         </p:txBody>
       </p:sp>
@@ -2574,7 +3094,7 @@
             <a:pPr>
               <a:defRPr/>
             </a:pPr>
-            <a:endParaRPr lang="en-US"/>
+            <a:endParaRPr lang="en-US" dirty="0"/>
           </a:p>
         </p:txBody>
       </p:sp>
@@ -2607,7 +3127,7 @@
               </a:pPr>
               <a:t>‹#›</a:t>
             </a:fld>
-            <a:endParaRPr lang="en-US"/>
+            <a:endParaRPr lang="en-US" dirty="0"/>
           </a:p>
         </p:txBody>
       </p:sp>
@@ -2945,7 +3465,7 @@
               </a:pPr>
               <a:t>12/6/22</a:t>
             </a:fld>
-            <a:endParaRPr lang="en-US"/>
+            <a:endParaRPr lang="en-US" dirty="0"/>
           </a:p>
         </p:txBody>
       </p:sp>
@@ -2971,7 +3491,7 @@
             <a:pPr>
               <a:defRPr/>
             </a:pPr>
-            <a:endParaRPr lang="en-US"/>
+            <a:endParaRPr lang="en-US" dirty="0"/>
           </a:p>
         </p:txBody>
       </p:sp>
@@ -3004,7 +3524,7 @@
               </a:pPr>
               <a:t>‹#›</a:t>
             </a:fld>
-            <a:endParaRPr lang="en-US"/>
+            <a:endParaRPr lang="en-US" dirty="0"/>
           </a:p>
         </p:txBody>
       </p:sp>
@@ -3098,7 +3618,7 @@
               </a:pPr>
               <a:t>12/6/22</a:t>
             </a:fld>
-            <a:endParaRPr lang="en-US"/>
+            <a:endParaRPr lang="en-US" dirty="0"/>
           </a:p>
         </p:txBody>
       </p:sp>
@@ -3124,7 +3644,7 @@
             <a:pPr>
               <a:defRPr/>
             </a:pPr>
-            <a:endParaRPr lang="en-US"/>
+            <a:endParaRPr lang="en-US" dirty="0"/>
           </a:p>
         </p:txBody>
       </p:sp>
@@ -3157,7 +3677,7 @@
               </a:pPr>
               <a:t>‹#›</a:t>
             </a:fld>
-            <a:endParaRPr lang="en-US"/>
+            <a:endParaRPr lang="en-US" dirty="0"/>
           </a:p>
         </p:txBody>
       </p:sp>
@@ -3220,7 +3740,7 @@
               </a:pPr>
               <a:t>12/6/22</a:t>
             </a:fld>
-            <a:endParaRPr lang="en-US"/>
+            <a:endParaRPr lang="en-US" dirty="0"/>
           </a:p>
         </p:txBody>
       </p:sp>
@@ -3246,7 +3766,7 @@
             <a:pPr>
               <a:defRPr/>
             </a:pPr>
-            <a:endParaRPr lang="en-US"/>
+            <a:endParaRPr lang="en-US" dirty="0"/>
           </a:p>
         </p:txBody>
       </p:sp>
@@ -3279,7 +3799,7 @@
               </a:pPr>
               <a:t>‹#›</a:t>
             </a:fld>
-            <a:endParaRPr lang="en-US"/>
+            <a:endParaRPr lang="en-US" dirty="0"/>
           </a:p>
         </p:txBody>
       </p:sp>
@@ -3527,7 +4047,7 @@
               </a:pPr>
               <a:t>12/6/22</a:t>
             </a:fld>
-            <a:endParaRPr lang="en-US"/>
+            <a:endParaRPr lang="en-US" dirty="0"/>
           </a:p>
         </p:txBody>
       </p:sp>
@@ -3553,7 +4073,7 @@
             <a:pPr>
               <a:defRPr/>
             </a:pPr>
-            <a:endParaRPr lang="en-US"/>
+            <a:endParaRPr lang="en-US" dirty="0"/>
           </a:p>
         </p:txBody>
       </p:sp>
@@ -3586,7 +4106,7 @@
               </a:pPr>
               <a:t>‹#›</a:t>
             </a:fld>
-            <a:endParaRPr lang="en-US"/>
+            <a:endParaRPr lang="en-US" dirty="0"/>
           </a:p>
         </p:txBody>
       </p:sp>
@@ -3716,10 +4236,9 @@
           <a:p>
             <a:pPr lvl="0"/>
             <a:r>
-              <a:rPr lang="en-US" noProof="0"/>
+              <a:rPr lang="en-US" noProof="0" dirty="0"/>
               <a:t>Click icon to add picture</a:t>
             </a:r>
-            <a:endParaRPr lang="en-US" noProof="0" dirty="0"/>
           </a:p>
         </p:txBody>
       </p:sp>
@@ -3817,7 +4336,7 @@
               </a:pPr>
               <a:t>12/6/22</a:t>
             </a:fld>
-            <a:endParaRPr lang="en-US"/>
+            <a:endParaRPr lang="en-US" dirty="0"/>
           </a:p>
         </p:txBody>
       </p:sp>
@@ -3843,7 +4362,7 @@
             <a:pPr>
               <a:defRPr/>
             </a:pPr>
-            <a:endParaRPr lang="en-US"/>
+            <a:endParaRPr lang="en-US" dirty="0"/>
           </a:p>
         </p:txBody>
       </p:sp>
@@ -3876,7 +4395,7 @@
               </a:pPr>
               <a:t>‹#›</a:t>
             </a:fld>
-            <a:endParaRPr lang="en-US"/>
+            <a:endParaRPr lang="en-US" dirty="0"/>
           </a:p>
         </p:txBody>
       </p:sp>
@@ -4843,6 +5362,7 @@
               <a:buNone/>
             </a:pPr>
             <a:r>
+              <a:rPr dirty="0"/>
               <a:t>2022-12-06</a:t>
             </a:r>
           </a:p>
@@ -4888,74 +5408,117 @@
             <a:off x="838200" y="365127"/>
             <a:ext cx="10515600" cy="1325563"/>
           </a:xfrm>
+        </p:spPr>
+        <p:txBody>
+          <a:bodyPr wrap="square" anchor="ctr">
+            <a:normAutofit/>
+          </a:bodyPr>
+          <a:lstStyle/>
+          <a:p>
+            <a:pPr marL="0" lvl="0" indent="0">
+              <a:buNone/>
+            </a:pPr>
+            <a:r>
+              <a:rPr dirty="0"/>
+              <a:t>Mechanics of process</a:t>
+            </a:r>
+          </a:p>
+        </p:txBody>
+      </p:sp>
+      <p:sp>
+        <p:nvSpPr>
+          <p:cNvPr id="3" name="Content Placeholder 2"/>
+          <p:cNvSpPr>
+            <a:spLocks noGrp="1"/>
+          </p:cNvSpPr>
+          <p:nvPr>
+            <p:ph sz="half" idx="1"/>
+          </p:nvPr>
+        </p:nvSpPr>
+        <p:spPr>
+          <a:xfrm>
+            <a:off x="838199" y="1825625"/>
+            <a:ext cx="7170683" cy="4351338"/>
+          </a:xfrm>
+        </p:spPr>
+        <p:txBody>
+          <a:bodyPr wrap="square" anchor="t">
+            <a:normAutofit/>
+          </a:bodyPr>
+          <a:lstStyle/>
+          <a:p>
+            <a:pPr lvl="0"/>
+            <a:r>
+              <a:rPr dirty="0"/>
+              <a:t>Criteria for initiating close out process</a:t>
+            </a:r>
+          </a:p>
+          <a:p>
+            <a:pPr lvl="0"/>
+            <a:r>
+              <a:rPr lang="en-US" dirty="0"/>
+              <a:t>Roles and </a:t>
+            </a:r>
+            <a:r>
+              <a:rPr dirty="0"/>
+              <a:t>responsibilities</a:t>
+            </a:r>
+            <a:endParaRPr lang="en-US" dirty="0"/>
+          </a:p>
+          <a:p>
+            <a:r>
+              <a:rPr lang="en-US" dirty="0"/>
+              <a:t>Definition of done</a:t>
+            </a:r>
+          </a:p>
+          <a:p>
+            <a:pPr lvl="0"/>
+            <a:endParaRPr dirty="0"/>
+          </a:p>
+          <a:p>
+            <a:pPr marL="0" lvl="0" indent="0">
+              <a:buNone/>
+            </a:pPr>
+            <a:endParaRPr dirty="0"/>
+          </a:p>
+        </p:txBody>
+      </p:sp>
+      <p:pic>
+        <p:nvPicPr>
+          <p:cNvPr id="5" name="Graphic 4" descr="Gears outline">
+            <a:extLst>
+              <a:ext uri="{FF2B5EF4-FFF2-40B4-BE49-F238E27FC236}">
+                <a16:creationId xmlns:a16="http://schemas.microsoft.com/office/drawing/2014/main" id="{0F643605-A0EA-EB2D-A6D5-687172637FC3}"/>
+              </a:ext>
+            </a:extLst>
+          </p:cNvPr>
+          <p:cNvPicPr>
+            <a:picLocks noChangeAspect="1"/>
+          </p:cNvPicPr>
+          <p:nvPr/>
+        </p:nvPicPr>
+        <p:blipFill>
+          <a:blip r:embed="rId3">
+            <a:extLst>
+              <a:ext uri="{96DAC541-7B7A-43D3-8B79-37D633B846F1}">
+                <asvg:svgBlip xmlns:asvg="http://schemas.microsoft.com/office/drawing/2016/SVG/main" r:embed="rId4"/>
+              </a:ext>
+            </a:extLst>
+          </a:blip>
+          <a:stretch>
+            <a:fillRect/>
+          </a:stretch>
+        </p:blipFill>
+        <p:spPr>
+          <a:xfrm>
+            <a:off x="6587331" y="1825625"/>
+            <a:ext cx="4351338" cy="4351338"/>
+          </a:xfrm>
           <a:prstGeom prst="rect">
             <a:avLst/>
           </a:prstGeom>
         </p:spPr>
-        <p:txBody>
-          <a:bodyPr/>
-          <a:lstStyle/>
-          <a:p>
-            <a:pPr marL="0" lvl="0" indent="0">
-              <a:buNone/>
-            </a:pPr>
-            <a:r>
-              <a:t>Mechanics of process</a:t>
-            </a:r>
-          </a:p>
-        </p:txBody>
-      </p:sp>
-      <p:sp>
-        <p:nvSpPr>
-          <p:cNvPr id="3" name="Content Placeholder 2"/>
-          <p:cNvSpPr>
-            <a:spLocks noGrp="1"/>
-          </p:cNvSpPr>
-          <p:nvPr>
-            <p:ph idx="1"/>
-          </p:nvPr>
-        </p:nvSpPr>
-        <p:spPr/>
-        <p:txBody>
-          <a:bodyPr/>
-          <a:lstStyle/>
-          <a:p>
-            <a:pPr lvl="0"/>
-            <a:r>
-              <a:rPr dirty="0"/>
-              <a:t>Criteria for initiating close out process</a:t>
-            </a:r>
-          </a:p>
-          <a:p>
-            <a:pPr lvl="0"/>
-            <a:r>
-              <a:rPr lang="en-US" dirty="0"/>
-              <a:t>Roles and </a:t>
-            </a:r>
-            <a:r>
-              <a:rPr dirty="0"/>
-              <a:t>responsibilities</a:t>
-            </a:r>
-            <a:endParaRPr lang="en-US" dirty="0"/>
-          </a:p>
-          <a:p>
-            <a:r>
-              <a:rPr lang="en-US" dirty="0"/>
-              <a:t>Definition of done</a:t>
-            </a:r>
-          </a:p>
-          <a:p>
-            <a:pPr lvl="0"/>
-            <a:endParaRPr dirty="0"/>
-          </a:p>
-          <a:p>
-            <a:pPr marL="0" lvl="0" indent="0">
-              <a:buNone/>
-            </a:pPr>
-            <a:endParaRPr dirty="0"/>
-          </a:p>
-        </p:txBody>
-      </p:sp>
+      </p:pic>
     </p:spTree>
   </p:cSld>
   <p:clrMapOvr>
@@ -4996,12 +5559,11 @@
             <a:off x="838200" y="365127"/>
             <a:ext cx="10515600" cy="1325563"/>
           </a:xfrm>
-          <a:prstGeom prst="rect">
-            <a:avLst/>
-          </a:prstGeom>
         </p:spPr>
         <p:txBody>
-          <a:bodyPr/>
+          <a:bodyPr wrap="square" anchor="ctr">
+            <a:normAutofit/>
+          </a:bodyPr>
           <a:lstStyle/>
           <a:p>
             <a:pPr marL="0" lvl="0" indent="0">
@@ -5029,9 +5591,16 @@
             <p:ph idx="1"/>
           </p:nvPr>
         </p:nvSpPr>
-        <p:spPr/>
-        <p:txBody>
-          <a:bodyPr/>
+        <p:spPr>
+          <a:xfrm>
+            <a:off x="838200" y="1825625"/>
+            <a:ext cx="10515600" cy="4351338"/>
+          </a:xfrm>
+        </p:spPr>
+        <p:txBody>
+          <a:bodyPr wrap="square" anchor="t">
+            <a:normAutofit/>
+          </a:bodyPr>
           <a:lstStyle/>
           <a:p>
             <a:pPr lvl="0"/>
@@ -5356,6 +5925,42 @@
           </a:p>
         </p:txBody>
       </p:sp>
+      <p:pic>
+        <p:nvPicPr>
+          <p:cNvPr id="7" name="Graphic 6" descr="Checklist with solid fill">
+            <a:extLst>
+              <a:ext uri="{FF2B5EF4-FFF2-40B4-BE49-F238E27FC236}">
+                <a16:creationId xmlns:a16="http://schemas.microsoft.com/office/drawing/2014/main" id="{AAE1C76E-9C08-D4DF-F908-B82C5E480E05}"/>
+              </a:ext>
+            </a:extLst>
+          </p:cNvPr>
+          <p:cNvPicPr>
+            <a:picLocks noChangeAspect="1"/>
+          </p:cNvPicPr>
+          <p:nvPr/>
+        </p:nvPicPr>
+        <p:blipFill>
+          <a:blip r:embed="rId2">
+            <a:extLst>
+              <a:ext uri="{96DAC541-7B7A-43D3-8B79-37D633B846F1}">
+                <asvg:svgBlip xmlns:asvg="http://schemas.microsoft.com/office/drawing/2016/SVG/main" r:embed="rId3"/>
+              </a:ext>
+            </a:extLst>
+          </a:blip>
+          <a:stretch>
+            <a:fillRect/>
+          </a:stretch>
+        </p:blipFill>
+        <p:spPr>
+          <a:xfrm>
+            <a:off x="9191296" y="3991411"/>
+            <a:ext cx="2501462" cy="2501462"/>
+          </a:xfrm>
+          <a:prstGeom prst="rect">
+            <a:avLst/>
+          </a:prstGeom>
+        </p:spPr>
+      </p:pic>
     </p:spTree>
     <p:extLst>
       <p:ext uri="{BB962C8B-B14F-4D97-AF65-F5344CB8AC3E}">
@@ -5443,13 +6048,17 @@
             </a:pPr>
             <a:r>
               <a:rPr dirty="0"/>
-              <a:t>We say we are going to do the following in a DMP, what do we need to make this a reality?</a:t>
+              <a:t>We say we are going to do the following in a DMP</a:t>
+            </a:r>
+            <a:r>
+              <a:rPr lang="en-US" dirty="0"/>
+              <a:t>, what’s needed to make each item a reality? How long do you expect it to take?</a:t>
             </a:r>
           </a:p>
           <a:p>
             <a:pPr lvl="0"/>
             <a:r>
-              <a:rPr dirty="0"/>
+              <a:rPr lang="en-US" dirty="0"/>
               <a:t>Release version controlled reproducible code</a:t>
             </a:r>
           </a:p>
@@ -5468,42 +6077,27 @@
               <a:t> </a:t>
             </a:r>
             <a:r>
-              <a:rPr dirty="0" err="1"/>
-              <a:t>sero</a:t>
+              <a:rPr lang="en-US" dirty="0"/>
+              <a:t>viral</a:t>
             </a:r>
             <a:r>
               <a:rPr dirty="0"/>
-              <a:t>-survey data in </a:t>
-            </a:r>
-            <a:r>
-              <a:rPr dirty="0" err="1"/>
-              <a:t>Zenodo</a:t>
-            </a:r>
-            <a:endParaRPr dirty="0"/>
+              <a:t>-survey data in Zenodo</a:t>
+            </a:r>
           </a:p>
           <a:p>
             <a:pPr lvl="0"/>
             <a:r>
               <a:rPr dirty="0"/>
-              <a:t>Deposit anonymized human survey data in </a:t>
-            </a:r>
-            <a:r>
-              <a:rPr dirty="0" err="1"/>
-              <a:t>Zenodo</a:t>
-            </a:r>
-            <a:endParaRPr dirty="0"/>
+              <a:t>Deposit anonymized human survey data in Zenodo</a:t>
+            </a:r>
           </a:p>
           <a:p>
             <a:pPr lvl="0"/>
             <a:r>
               <a:rPr dirty="0"/>
-              <a:t>Publish nucleotide sequence data to </a:t>
-            </a:r>
-            <a:r>
-              <a:rPr dirty="0" err="1"/>
-              <a:t>Genbank</a:t>
-            </a:r>
-            <a:endParaRPr dirty="0"/>
+              <a:t>Publish nucleotide sequence data to Genbank</a:t>
+            </a:r>
           </a:p>
           <a:p>
             <a:pPr lvl="0"/>
@@ -5566,6 +6160,7 @@
               <a:buNone/>
             </a:pPr>
             <a:r>
+              <a:rPr dirty="0"/>
               <a:t>Discussion</a:t>
             </a:r>
           </a:p>
@@ -5619,27 +6214,19 @@
             <a:pPr lvl="0"/>
             <a:r>
               <a:rPr dirty="0"/>
-              <a:t>How should we close out assets? (</a:t>
-            </a:r>
-            <a:r>
-              <a:rPr dirty="0" err="1"/>
-              <a:t>airtable</a:t>
+              <a:t>How should we close out assets? (Airtable, </a:t>
+            </a:r>
+            <a:r>
+              <a:rPr lang="en-US" dirty="0"/>
+              <a:t>AWS</a:t>
             </a:r>
             <a:r>
               <a:rPr dirty="0"/>
               <a:t>, </a:t>
             </a:r>
             <a:r>
-              <a:rPr dirty="0" err="1"/>
-              <a:t>aws</a:t>
-            </a:r>
-            <a:r>
-              <a:rPr dirty="0"/>
-              <a:t>, </a:t>
-            </a:r>
-            <a:r>
-              <a:rPr dirty="0" err="1"/>
-              <a:t>odk</a:t>
+              <a:rPr lang="en-US" dirty="0"/>
+              <a:t>ODK</a:t>
             </a:r>
             <a:r>
               <a:rPr dirty="0"/>
@@ -5657,7 +6244,23 @@
             <a:pPr lvl="0"/>
             <a:r>
               <a:rPr dirty="0"/>
-              <a:t>How might we handle data or assets that must remain private?</a:t>
+              <a:t>How might we </a:t>
+            </a:r>
+            <a:r>
+              <a:rPr lang="en-US" dirty="0"/>
+              <a:t>make private</a:t>
+            </a:r>
+            <a:r>
+              <a:rPr dirty="0"/>
+              <a:t> data or assets</a:t>
+            </a:r>
+            <a:r>
+              <a:rPr lang="en-US" dirty="0"/>
+              <a:t> findable</a:t>
+            </a:r>
+            <a:r>
+              <a:rPr dirty="0"/>
+              <a:t>?</a:t>
             </a:r>
           </a:p>
         </p:txBody>
@@ -5689,6 +6292,70 @@
       </p:grpSpPr>
       <p:sp>
         <p:nvSpPr>
+          <p:cNvPr id="2" name="Title 1"/>
+          <p:cNvSpPr>
+            <a:spLocks noGrp="1"/>
+          </p:cNvSpPr>
+          <p:nvPr>
+            <p:ph type="title"/>
+          </p:nvPr>
+        </p:nvSpPr>
+        <p:spPr>
+          <a:xfrm>
+            <a:off x="838200" y="2766218"/>
+            <a:ext cx="10515600" cy="1325563"/>
+          </a:xfrm>
+          <a:prstGeom prst="rect">
+            <a:avLst/>
+          </a:prstGeom>
+        </p:spPr>
+        <p:txBody>
+          <a:bodyPr/>
+          <a:lstStyle/>
+          <a:p>
+            <a:pPr marL="0" lvl="0" indent="0" algn="ctr">
+              <a:buNone/>
+            </a:pPr>
+            <a:r>
+              <a:rPr lang="en-US" dirty="0"/>
+              <a:t>Thanks!</a:t>
+            </a:r>
+            <a:endParaRPr dirty="0"/>
+          </a:p>
+        </p:txBody>
+      </p:sp>
+    </p:spTree>
+    <p:extLst>
+      <p:ext uri="{BB962C8B-B14F-4D97-AF65-F5344CB8AC3E}">
+        <p14:creationId xmlns:p14="http://schemas.microsoft.com/office/powerpoint/2010/main" val="2205921755"/>
+      </p:ext>
+    </p:extLst>
+  </p:cSld>
+  <p:clrMapOvr>
+    <a:masterClrMapping/>
+  </p:clrMapOvr>
+</p:sld>
+</file>
+
+<file path=ppt/slides/slide17.xml><?xml version="1.0" encoding="utf-8"?>
+<p:sld xmlns:a="http://schemas.openxmlformats.org/drawingml/2006/main" xmlns:r="http://schemas.openxmlformats.org/officeDocument/2006/relationships" xmlns:p="http://schemas.openxmlformats.org/presentationml/2006/main">
+  <p:cSld>
+    <p:spTree>
+      <p:nvGrpSpPr>
+        <p:cNvPr id="1" name=""/>
+        <p:cNvGrpSpPr/>
+        <p:nvPr/>
+      </p:nvGrpSpPr>
+      <p:grpSpPr>
+        <a:xfrm>
+          <a:off x="0" y="0"/>
+          <a:ext cx="0" cy="0"/>
+          <a:chOff x="0" y="0"/>
+          <a:chExt cx="0" cy="0"/>
+        </a:xfrm>
+      </p:grpSpPr>
+      <p:sp>
+        <p:nvSpPr>
           <p:cNvPr id="2" name="Title 1">
             <a:extLst>
               <a:ext uri="{FF2B5EF4-FFF2-40B4-BE49-F238E27FC236}">
@@ -5765,6 +6432,113 @@
     <p:extLst>
       <p:ext uri="{BB962C8B-B14F-4D97-AF65-F5344CB8AC3E}">
         <p14:creationId xmlns:p14="http://schemas.microsoft.com/office/powerpoint/2010/main" val="302417290"/>
+      </p:ext>
+    </p:extLst>
+  </p:cSld>
+  <p:clrMapOvr>
+    <a:masterClrMapping/>
+  </p:clrMapOvr>
+</p:sld>
+</file>
+
+<file path=ppt/slides/slide18.xml><?xml version="1.0" encoding="utf-8"?>
+<p:sld xmlns:a="http://schemas.openxmlformats.org/drawingml/2006/main" xmlns:r="http://schemas.openxmlformats.org/officeDocument/2006/relationships" xmlns:p="http://schemas.openxmlformats.org/presentationml/2006/main">
+  <p:cSld>
+    <p:spTree>
+      <p:nvGrpSpPr>
+        <p:cNvPr id="1" name=""/>
+        <p:cNvGrpSpPr/>
+        <p:nvPr/>
+      </p:nvGrpSpPr>
+      <p:grpSpPr>
+        <a:xfrm>
+          <a:off x="0" y="0"/>
+          <a:ext cx="0" cy="0"/>
+          <a:chOff x="0" y="0"/>
+          <a:chExt cx="0" cy="0"/>
+        </a:xfrm>
+      </p:grpSpPr>
+      <p:sp>
+        <p:nvSpPr>
+          <p:cNvPr id="2" name="Title 1">
+            <a:extLst>
+              <a:ext uri="{FF2B5EF4-FFF2-40B4-BE49-F238E27FC236}">
+                <a16:creationId xmlns:a16="http://schemas.microsoft.com/office/drawing/2014/main" id="{A5068D59-0B74-B331-D3CE-B9C3F5BB699C}"/>
+              </a:ext>
+            </a:extLst>
+          </p:cNvPr>
+          <p:cNvSpPr>
+            <a:spLocks noGrp="1"/>
+          </p:cNvSpPr>
+          <p:nvPr>
+            <p:ph type="title"/>
+          </p:nvPr>
+        </p:nvSpPr>
+        <p:spPr/>
+        <p:txBody>
+          <a:bodyPr/>
+          <a:lstStyle/>
+          <a:p>
+            <a:r>
+              <a:rPr lang="en-US" dirty="0"/>
+              <a:t>DMPTool.org</a:t>
+            </a:r>
+          </a:p>
+        </p:txBody>
+      </p:sp>
+      <p:sp>
+        <p:nvSpPr>
+          <p:cNvPr id="3" name="Content Placeholder 2">
+            <a:extLst>
+              <a:ext uri="{FF2B5EF4-FFF2-40B4-BE49-F238E27FC236}">
+                <a16:creationId xmlns:a16="http://schemas.microsoft.com/office/drawing/2014/main" id="{0AE233C8-3A38-84DA-17CC-71E6EEE117C3}"/>
+              </a:ext>
+            </a:extLst>
+          </p:cNvPr>
+          <p:cNvSpPr>
+            <a:spLocks noGrp="1"/>
+          </p:cNvSpPr>
+          <p:nvPr>
+            <p:ph idx="1"/>
+          </p:nvPr>
+        </p:nvSpPr>
+        <p:spPr/>
+        <p:txBody>
+          <a:bodyPr/>
+          <a:lstStyle/>
+          <a:p>
+            <a:r>
+              <a:rPr lang="en-US" dirty="0"/>
+              <a:t>A wizard for creating data management plans</a:t>
+            </a:r>
+          </a:p>
+          <a:p>
+            <a:r>
+              <a:rPr lang="en-US" dirty="0"/>
+              <a:t>Allows for networking research outputs via stable identifiers</a:t>
+            </a:r>
+          </a:p>
+          <a:p>
+            <a:r>
+              <a:rPr lang="en-US" dirty="0"/>
+              <a:t>Creates a central location for information about projects with data outputs</a:t>
+            </a:r>
+          </a:p>
+          <a:p>
+            <a:pPr marL="0" indent="0">
+              <a:buNone/>
+            </a:pPr>
+            <a:r>
+              <a:rPr lang="en-US" dirty="0"/>
+              <a:t> </a:t>
+            </a:r>
+          </a:p>
+        </p:txBody>
+      </p:sp>
+    </p:spTree>
+    <p:extLst>
+      <p:ext uri="{BB962C8B-B14F-4D97-AF65-F5344CB8AC3E}">
+        <p14:creationId xmlns:p14="http://schemas.microsoft.com/office/powerpoint/2010/main" val="1359071175"/>
       </p:ext>
     </p:extLst>
   </p:cSld>
@@ -5818,6 +6592,7 @@
               <a:buNone/>
             </a:pPr>
             <a:r>
+              <a:rPr dirty="0"/>
               <a:t>Introduction</a:t>
             </a:r>
           </a:p>
@@ -5840,18 +6615,21 @@
           <a:p>
             <a:pPr lvl="0"/>
             <a:r>
-              <a:t>Ending projects properly ensures compliance with award obligations, supports proper management of resources, and facilitates reuse of research outputs (code, data, protocols, etc).</a:t>
+              <a:rPr dirty="0"/>
+              <a:t>Ending projects properly ensures compliance with award obligations, supports proper management of resources, and facilitates reuse of research outputs (code, data, protocols, etc.).</a:t>
             </a:r>
           </a:p>
           <a:p>
             <a:pPr lvl="0"/>
             <a:r>
+              <a:rPr dirty="0"/>
               <a:t>Creating reusable research outputs increases research impact</a:t>
             </a:r>
           </a:p>
           <a:p>
             <a:pPr lvl="0"/>
             <a:r>
+              <a:rPr dirty="0"/>
               <a:t>Primary beneficiary will be you.</a:t>
             </a:r>
           </a:p>
@@ -6028,6 +6806,7 @@
               <a:buNone/>
             </a:pPr>
             <a:r>
+              <a:rPr dirty="0"/>
               <a:t>Overview of strategy</a:t>
             </a:r>
           </a:p>
@@ -6174,6 +6953,7 @@
               <a:buNone/>
             </a:pPr>
             <a:r>
+              <a:rPr dirty="0"/>
               <a:t>Overview of strategy: Guiding principles</a:t>
             </a:r>
           </a:p>
@@ -6196,18 +6976,21 @@
           <a:p>
             <a:pPr lvl="0"/>
             <a:r>
+              <a:rPr dirty="0"/>
               <a:t>Data management plans change with the project</a:t>
             </a:r>
           </a:p>
           <a:p>
             <a:pPr lvl="0"/>
             <a:r>
+              <a:rPr dirty="0"/>
               <a:t>Digital and physical assets are properly managed</a:t>
             </a:r>
           </a:p>
           <a:p>
             <a:pPr lvl="0"/>
             <a:r>
+              <a:rPr dirty="0"/>
               <a:t>Published outputs can be found and interpreted by users outside the project</a:t>
             </a:r>
           </a:p>
@@ -6265,6 +7048,7 @@
               <a:buNone/>
             </a:pPr>
             <a:r>
+              <a:rPr dirty="0"/>
               <a:t>Overview of Strategy: Living data management plans</a:t>
             </a:r>
           </a:p>
@@ -6321,6 +7105,53 @@
           </a:p>
         </p:txBody>
       </p:sp>
+      <p:pic>
+        <p:nvPicPr>
+          <p:cNvPr id="1026" name="Picture 2">
+            <a:extLst>
+              <a:ext uri="{FF2B5EF4-FFF2-40B4-BE49-F238E27FC236}">
+                <a16:creationId xmlns:a16="http://schemas.microsoft.com/office/drawing/2014/main" id="{EB9C0293-F9CA-C9BE-B5A1-630F2E0BC4CA}"/>
+              </a:ext>
+            </a:extLst>
+          </p:cNvPr>
+          <p:cNvPicPr>
+            <a:picLocks noChangeAspect="1" noChangeArrowheads="1"/>
+          </p:cNvPicPr>
+          <p:nvPr/>
+        </p:nvPicPr>
+        <p:blipFill>
+          <a:blip r:embed="rId2">
+            <a:extLst>
+              <a:ext uri="{28A0092B-C50C-407E-A947-70E740481C1C}">
+                <a14:useLocalDpi xmlns:a14="http://schemas.microsoft.com/office/drawing/2010/main" val="0"/>
+              </a:ext>
+            </a:extLst>
+          </a:blip>
+          <a:srcRect/>
+          <a:stretch>
+            <a:fillRect/>
+          </a:stretch>
+        </p:blipFill>
+        <p:spPr bwMode="auto">
+          <a:xfrm>
+            <a:off x="8229600" y="3429000"/>
+            <a:ext cx="3297620" cy="3297620"/>
+          </a:xfrm>
+          <a:prstGeom prst="rect">
+            <a:avLst/>
+          </a:prstGeom>
+          <a:noFill/>
+          <a:extLst>
+            <a:ext uri="{909E8E84-426E-40DD-AFC4-6F175D3DCCD1}">
+              <a14:hiddenFill xmlns:a14="http://schemas.microsoft.com/office/drawing/2010/main">
+                <a:solidFill>
+                  <a:srgbClr val="FFFFFF"/>
+                </a:solidFill>
+              </a14:hiddenFill>
+            </a:ext>
+          </a:extLst>
+        </p:spPr>
+      </p:pic>
     </p:spTree>
   </p:cSld>
   <p:clrMapOvr>
@@ -6373,6 +7204,7 @@
               <a:buNone/>
             </a:pPr>
             <a:r>
+              <a:rPr dirty="0"/>
               <a:t>Overview of Strategy: Asset Management</a:t>
             </a:r>
           </a:p>
@@ -6395,29 +7227,70 @@
           <a:p>
             <a:pPr lvl="0"/>
             <a:r>
+              <a:rPr dirty="0"/>
               <a:t>Where possible, services that are no longer needed should be shut down</a:t>
             </a:r>
           </a:p>
           <a:p>
             <a:pPr lvl="0"/>
             <a:r>
-              <a:t>Where possible, code running against cloud based data stores (airtable, odk, aws) should be run from version controlled data files.</a:t>
-            </a:r>
+              <a:rPr lang="en-US" dirty="0"/>
+              <a:t>Where possible, code running against cloud based data stores (Airtable, ODK, AWS) should be run from version controlled data files.</a:t>
+            </a:r>
+            <a:endParaRPr dirty="0"/>
           </a:p>
           <a:p>
             <a:pPr lvl="0"/>
             <a:r>
+              <a:rPr dirty="0"/>
               <a:t>User access to services should be reviewed</a:t>
             </a:r>
           </a:p>
           <a:p>
             <a:pPr lvl="0"/>
             <a:r>
-              <a:t>Physical items should be appropriately archived and documented (e.g. reagents, specimens, etc)</a:t>
-            </a:r>
-          </a:p>
-        </p:txBody>
-      </p:sp>
+              <a:rPr dirty="0"/>
+              <a:t>Physical items should be appropriately archived and documented (e.g. reagents, specimens, etc.)</a:t>
+            </a:r>
+          </a:p>
+        </p:txBody>
+      </p:sp>
+      <p:pic>
+        <p:nvPicPr>
+          <p:cNvPr id="5" name="Graphic 4" descr="Ui Ux with solid fill">
+            <a:extLst>
+              <a:ext uri="{FF2B5EF4-FFF2-40B4-BE49-F238E27FC236}">
+                <a16:creationId xmlns:a16="http://schemas.microsoft.com/office/drawing/2014/main" id="{D4AA722C-165B-0988-DD7E-F2C872B562C1}"/>
+              </a:ext>
+            </a:extLst>
+          </p:cNvPr>
+          <p:cNvPicPr>
+            <a:picLocks noChangeAspect="1"/>
+          </p:cNvPicPr>
+          <p:nvPr/>
+        </p:nvPicPr>
+        <p:blipFill>
+          <a:blip r:embed="rId2">
+            <a:extLst>
+              <a:ext uri="{96DAC541-7B7A-43D3-8B79-37D633B846F1}">
+                <asvg:svgBlip xmlns:asvg="http://schemas.microsoft.com/office/drawing/2016/SVG/main" r:embed="rId3"/>
+              </a:ext>
+            </a:extLst>
+          </a:blip>
+          <a:stretch>
+            <a:fillRect/>
+          </a:stretch>
+        </p:blipFill>
+        <p:spPr>
+          <a:xfrm>
+            <a:off x="9404131" y="4351283"/>
+            <a:ext cx="2433144" cy="2433144"/>
+          </a:xfrm>
+          <a:prstGeom prst="rect">
+            <a:avLst/>
+          </a:prstGeom>
+        </p:spPr>
+      </p:pic>
     </p:spTree>
   </p:cSld>
   <p:clrMapOvr>
@@ -6470,6 +7343,7 @@
               <a:buNone/>
             </a:pPr>
             <a:r>
+              <a:rPr dirty="0"/>
               <a:t>Overview of Strategy: Code</a:t>
             </a:r>
           </a:p>
@@ -6492,47 +7366,90 @@
           <a:p>
             <a:pPr lvl="0"/>
             <a:r>
+              <a:rPr dirty="0"/>
               <a:t>Use best practices for reproducible software</a:t>
             </a:r>
           </a:p>
           <a:p>
             <a:pPr lvl="1"/>
             <a:r>
-              <a:t>self contained projects (rstudio projects)</a:t>
+              <a:rPr dirty="0"/>
+              <a:t>self contained projects (RStudio projects)</a:t>
             </a:r>
           </a:p>
           <a:p>
             <a:pPr lvl="1"/>
             <a:r>
-              <a:t>version controlled code (git and github)</a:t>
+              <a:rPr dirty="0"/>
+              <a:t>version controlled code (git and GitHub)</a:t>
             </a:r>
           </a:p>
           <a:p>
             <a:pPr lvl="1"/>
             <a:r>
+              <a:rPr dirty="0"/>
               <a:t>literate coding practices (in line documentation)</a:t>
             </a:r>
           </a:p>
           <a:p>
             <a:pPr lvl="1"/>
             <a:r>
+              <a:rPr dirty="0"/>
               <a:t>dependency management (renv, docker)</a:t>
             </a:r>
           </a:p>
           <a:p>
             <a:pPr lvl="1"/>
             <a:r>
+              <a:rPr dirty="0"/>
               <a:t>automated code runs (targets, docker)</a:t>
             </a:r>
           </a:p>
           <a:p>
             <a:pPr lvl="0"/>
             <a:r>
+              <a:rPr dirty="0"/>
               <a:t>Provide sufficient meta data about your project to give context and facilitate attribution</a:t>
             </a:r>
           </a:p>
         </p:txBody>
       </p:sp>
+      <p:pic>
+        <p:nvPicPr>
+          <p:cNvPr id="5" name="Graphic 4" descr="Programmer female outline">
+            <a:extLst>
+              <a:ext uri="{FF2B5EF4-FFF2-40B4-BE49-F238E27FC236}">
+                <a16:creationId xmlns:a16="http://schemas.microsoft.com/office/drawing/2014/main" id="{914F8870-2C2A-49A1-F775-3F7B3F9789AB}"/>
+              </a:ext>
+            </a:extLst>
+          </p:cNvPr>
+          <p:cNvPicPr>
+            <a:picLocks noChangeAspect="1"/>
+          </p:cNvPicPr>
+          <p:nvPr/>
+        </p:nvPicPr>
+        <p:blipFill>
+          <a:blip r:embed="rId2">
+            <a:extLst>
+              <a:ext uri="{96DAC541-7B7A-43D3-8B79-37D633B846F1}">
+                <asvg:svgBlip xmlns:asvg="http://schemas.microsoft.com/office/drawing/2016/SVG/main" r:embed="rId3"/>
+              </a:ext>
+            </a:extLst>
+          </a:blip>
+          <a:stretch>
+            <a:fillRect/>
+          </a:stretch>
+        </p:blipFill>
+        <p:spPr>
+          <a:xfrm>
+            <a:off x="8366537" y="386557"/>
+            <a:ext cx="3444463" cy="3444463"/>
+          </a:xfrm>
+          <a:prstGeom prst="rect">
+            <a:avLst/>
+          </a:prstGeom>
+        </p:spPr>
+      </p:pic>
     </p:spTree>
   </p:cSld>
   <p:clrMapOvr>
@@ -6585,6 +7502,7 @@
               <a:buNone/>
             </a:pPr>
             <a:r>
+              <a:rPr dirty="0"/>
               <a:t>Overview of Strategy: Data</a:t>
             </a:r>
           </a:p>
@@ -6659,6 +7577,42 @@
           </a:p>
         </p:txBody>
       </p:sp>
+      <p:pic>
+        <p:nvPicPr>
+          <p:cNvPr id="5" name="Graphic 4" descr="Folder Search outline">
+            <a:extLst>
+              <a:ext uri="{FF2B5EF4-FFF2-40B4-BE49-F238E27FC236}">
+                <a16:creationId xmlns:a16="http://schemas.microsoft.com/office/drawing/2014/main" id="{2B1037E0-4861-2E03-F048-33E758972639}"/>
+              </a:ext>
+            </a:extLst>
+          </p:cNvPr>
+          <p:cNvPicPr>
+            <a:picLocks noChangeAspect="1"/>
+          </p:cNvPicPr>
+          <p:nvPr/>
+        </p:nvPicPr>
+        <p:blipFill>
+          <a:blip r:embed="rId3">
+            <a:extLst>
+              <a:ext uri="{96DAC541-7B7A-43D3-8B79-37D633B846F1}">
+                <asvg:svgBlip xmlns:asvg="http://schemas.microsoft.com/office/drawing/2016/SVG/main" r:embed="rId4"/>
+              </a:ext>
+            </a:extLst>
+          </a:blip>
+          <a:stretch>
+            <a:fillRect/>
+          </a:stretch>
+        </p:blipFill>
+        <p:spPr>
+          <a:xfrm>
+            <a:off x="8718331" y="3636687"/>
+            <a:ext cx="2864069" cy="2864069"/>
+          </a:xfrm>
+          <a:prstGeom prst="rect">
+            <a:avLst/>
+          </a:prstGeom>
+        </p:spPr>
+      </p:pic>
     </p:spTree>
   </p:cSld>
   <p:clrMapOvr>

</xml_diff>